<commit_message>
Made the poster being rendered more stable between different versions of PowerPoint. Who the fuck thought it was a good idea to use PowerPoint for something like this?
</commit_message>
<xml_diff>
--- a/poster/Poster A1, Bitmessage for Android, Christian Basler.pptx
+++ b/poster/Poster A1, Bitmessage for Android, Christian Basler.pptx
@@ -188,14 +188,14 @@
             <a:noFill/>
           </a:ln>
           <a:extLst>
-            <a:ext uri="{909E8E84-426E-40dd-AFC4-6F175D3DCCD1}">
+            <a:ext uri="{909E8E84-426E-40DD-AFC4-6F175D3DCCD1}">
               <a14:hiddenFill xmlns:a14="http://schemas.microsoft.com/office/drawing/2010/main">
                 <a:solidFill>
                   <a:srgbClr val="FFFFFF"/>
                 </a:solidFill>
               </a14:hiddenFill>
             </a:ext>
-            <a:ext uri="{91240B29-F687-4f45-9708-019B960494DF}">
+            <a:ext uri="{91240B29-F687-4F45-9708-019B960494DF}">
               <a14:hiddenLine xmlns:a14="http://schemas.microsoft.com/office/drawing/2010/main" w="9525">
                 <a:solidFill>
                   <a:srgbClr val="000000"/>
@@ -273,14 +273,14 @@
             <a:noFill/>
           </a:ln>
           <a:extLst>
-            <a:ext uri="{909E8E84-426E-40dd-AFC4-6F175D3DCCD1}">
+            <a:ext uri="{909E8E84-426E-40DD-AFC4-6F175D3DCCD1}">
               <a14:hiddenFill xmlns:a14="http://schemas.microsoft.com/office/drawing/2010/main">
                 <a:solidFill>
                   <a:srgbClr val="FFFFFF"/>
                 </a:solidFill>
               </a14:hiddenFill>
             </a:ext>
-            <a:ext uri="{91240B29-F687-4f45-9708-019B960494DF}">
+            <a:ext uri="{91240B29-F687-4F45-9708-019B960494DF}">
               <a14:hiddenLine xmlns:a14="http://schemas.microsoft.com/office/drawing/2010/main" w="9525">
                 <a:solidFill>
                   <a:srgbClr val="000000"/>
@@ -501,7 +501,7 @@
   <p:timing>
     <p:tnLst>
       <p:par>
-        <p:cTn xmlns:p14="http://schemas.microsoft.com/office/powerpoint/2010/main" id="1" dur="indefinite" restart="never" nodeType="tmRoot"/>
+        <p:cTn id="1" dur="indefinite" restart="never" nodeType="tmRoot"/>
       </p:par>
     </p:tnLst>
   </p:timing>
@@ -952,7 +952,7 @@
           </a:prstGeom>
           <a:noFill/>
           <a:extLst>
-            <a:ext uri="{909E8E84-426E-40dd-AFC4-6F175D3DCCD1}">
+            <a:ext uri="{909E8E84-426E-40DD-AFC4-6F175D3DCCD1}">
               <a14:hiddenFill xmlns:a14="http://schemas.microsoft.com/office/drawing/2010/main">
                 <a:solidFill>
                   <a:srgbClr val="FFFFFF"/>
@@ -1568,7 +1568,7 @@
         <p:spPr>
           <a:xfrm>
             <a:off x="898776" y="896767"/>
-            <a:ext cx="8845847" cy="16527607"/>
+            <a:ext cx="8845847" cy="13572946"/>
           </a:xfrm>
           <a:prstGeom prst="rect">
             <a:avLst/>
@@ -1729,60 +1729,9 @@
               </a:rPr>
               <a:t>.</a:t>
             </a:r>
-          </a:p>
-          <a:p>
-            <a:pPr algn="just">
-              <a:buClr>
-                <a:srgbClr val="FAA500"/>
-              </a:buClr>
-              <a:buSzPct val="80000"/>
-              <a:defRPr/>
-            </a:pPr>
             <a:endParaRPr lang="en-US" altLang="de-DE" sz="3200" dirty="0" smtClean="0">
               <a:latin typeface="Lucida Sans" pitchFamily="34" charset="0"/>
             </a:endParaRPr>
-          </a:p>
-          <a:p>
-            <a:pPr algn="just">
-              <a:buClr>
-                <a:srgbClr val="FAA500"/>
-              </a:buClr>
-              <a:buSzPct val="80000"/>
-              <a:defRPr/>
-            </a:pPr>
-            <a:endParaRPr lang="en-US" altLang="de-DE" sz="3200" i="1" dirty="0">
-              <a:latin typeface="Lucida Sans" pitchFamily="34" charset="0"/>
-            </a:endParaRPr>
-          </a:p>
-          <a:p>
-            <a:pPr algn="r">
-              <a:buClr>
-                <a:srgbClr val="FAA500"/>
-              </a:buClr>
-              <a:buSzPct val="80000"/>
-              <a:defRPr/>
-            </a:pPr>
-            <a:r>
-              <a:rPr lang="en-US" altLang="de-DE" sz="3200" i="1" dirty="0" smtClean="0">
-                <a:latin typeface="Lucida Sans" pitchFamily="34" charset="0"/>
-              </a:rPr>
-              <a:t>Scan this QR code to get more               .</a:t>
-            </a:r>
-          </a:p>
-          <a:p>
-            <a:pPr algn="r">
-              <a:buClr>
-                <a:srgbClr val="FAA500"/>
-              </a:buClr>
-              <a:buSzPct val="80000"/>
-              <a:defRPr/>
-            </a:pPr>
-            <a:r>
-              <a:rPr lang="en-US" altLang="de-DE" sz="3200" i="1" dirty="0" smtClean="0">
-                <a:latin typeface="Lucida Sans" pitchFamily="34" charset="0"/>
-              </a:rPr>
-              <a:t>information about the app               .</a:t>
-            </a:r>
           </a:p>
         </p:txBody>
       </p:sp>
@@ -1864,7 +1813,7 @@
           </a:prstGeom>
           <a:noFill/>
           <a:extLst>
-            <a:ext uri="{909E8E84-426E-40dd-AFC4-6F175D3DCCD1}">
+            <a:ext uri="{909E8E84-426E-40DD-AFC4-6F175D3DCCD1}">
               <a14:hiddenFill xmlns:a14="http://schemas.microsoft.com/office/drawing/2010/main">
                 <a:solidFill>
                   <a:srgbClr val="FFFFFF"/>
@@ -1883,7 +1832,7 @@
         <p:spPr>
           <a:xfrm>
             <a:off x="20508884" y="896767"/>
-            <a:ext cx="8845847" cy="11480068"/>
+            <a:ext cx="8845847" cy="10926068"/>
           </a:xfrm>
           <a:prstGeom prst="rect">
             <a:avLst/>
@@ -2003,19 +1952,7 @@
               <a:rPr lang="en-GB" altLang="de-DE" sz="3200" dirty="0" smtClean="0">
                 <a:latin typeface="Lucida Sans" pitchFamily="34" charset="0"/>
               </a:rPr>
-              <a:t>The way addresses look is a </a:t>
-            </a:r>
-            <a:r>
-              <a:rPr lang="en-GB" altLang="de-DE" sz="3200" dirty="0" smtClean="0">
-                <a:latin typeface="Lucida Sans" pitchFamily="34" charset="0"/>
-              </a:rPr>
-              <a:t>disadvantage </a:t>
-            </a:r>
-            <a:r>
-              <a:rPr lang="en-GB" altLang="de-DE" sz="3200" dirty="0" smtClean="0">
-                <a:latin typeface="Lucida Sans" pitchFamily="34" charset="0"/>
-              </a:rPr>
-              <a:t>that ensues:</a:t>
+              <a:t>The way addresses look is a disadvantage that ensues:</a:t>
             </a:r>
             <a:endParaRPr lang="en-GB" altLang="de-DE" sz="3200" dirty="0">
               <a:latin typeface="Lucida Sans" pitchFamily="34" charset="0"/>
@@ -2042,7 +1979,7 @@
               <a:defRPr/>
             </a:pPr>
             <a:r>
-              <a:rPr lang="en-GB" altLang="de-DE" sz="3060" dirty="0" smtClean="0">
+              <a:rPr lang="en-GB" altLang="de-DE" sz="2800" dirty="0" smtClean="0">
                 <a:latin typeface="Lucida Console"/>
                 <a:cs typeface="Lucida Console"/>
               </a:rPr>
@@ -2058,13 +1995,13 @@
               <a:defRPr/>
             </a:pPr>
             <a:r>
-              <a:rPr lang="en-GB" altLang="de-DE" sz="3060" dirty="0">
+              <a:rPr lang="en-GB" altLang="de-DE" sz="2800" dirty="0">
                 <a:latin typeface="Lucida Console"/>
                 <a:cs typeface="Lucida Console"/>
               </a:rPr>
               <a:t>BM-2cUau5uxBYCK2Z2TVwUZnnNfYW5yyutekC</a:t>
             </a:r>
-            <a:endParaRPr lang="en-GB" altLang="de-DE" sz="3060" dirty="0" smtClean="0">
+            <a:endParaRPr lang="en-GB" altLang="de-DE" sz="2800" dirty="0" smtClean="0">
               <a:latin typeface="Lucida Console"/>
               <a:cs typeface="Lucida Console"/>
             </a:endParaRPr>
@@ -2160,6 +2097,65 @@
           </a:p>
         </p:txBody>
       </p:sp>
+      <p:sp>
+        <p:nvSpPr>
+          <p:cNvPr id="4" name="Textfeld 3"/>
+          <p:cNvSpPr txBox="1"/>
+          <p:nvPr/>
+        </p:nvSpPr>
+        <p:spPr>
+          <a:xfrm>
+            <a:off x="898777" y="15406597"/>
+            <a:ext cx="6416424" cy="1077218"/>
+          </a:xfrm>
+          <a:prstGeom prst="rect">
+            <a:avLst/>
+          </a:prstGeom>
+          <a:noFill/>
+        </p:spPr>
+        <p:txBody>
+          <a:bodyPr wrap="square" rtlCol="0">
+            <a:spAutoFit/>
+          </a:bodyPr>
+          <a:lstStyle/>
+          <a:p>
+            <a:pPr algn="r">
+              <a:buClr>
+                <a:srgbClr val="FAA500"/>
+              </a:buClr>
+              <a:buSzPct val="80000"/>
+              <a:defRPr/>
+            </a:pPr>
+            <a:r>
+              <a:rPr lang="en-US" altLang="de-DE" sz="3200" i="1" dirty="0">
+                <a:latin typeface="Lucida Sans" pitchFamily="34" charset="0"/>
+              </a:rPr>
+              <a:t>Scan this QR code to get </a:t>
+            </a:r>
+            <a:r>
+              <a:rPr lang="en-US" altLang="de-DE" sz="3200" i="1" dirty="0" smtClean="0">
+                <a:latin typeface="Lucida Sans" pitchFamily="34" charset="0"/>
+              </a:rPr>
+              <a:t>more information </a:t>
+            </a:r>
+            <a:r>
+              <a:rPr lang="en-US" altLang="de-DE" sz="3200" i="1" dirty="0">
+                <a:latin typeface="Lucida Sans" pitchFamily="34" charset="0"/>
+              </a:rPr>
+              <a:t>about the </a:t>
+            </a:r>
+            <a:r>
+              <a:rPr lang="en-US" altLang="de-DE" sz="3200" i="1" dirty="0" smtClean="0">
+                <a:latin typeface="Lucida Sans" pitchFamily="34" charset="0"/>
+              </a:rPr>
+              <a:t>app</a:t>
+            </a:r>
+            <a:endParaRPr lang="en-US" altLang="de-DE" sz="3200" i="1" dirty="0">
+              <a:latin typeface="Lucida Sans" pitchFamily="34" charset="0"/>
+            </a:endParaRPr>
+          </a:p>
+        </p:txBody>
+      </p:sp>
     </p:spTree>
     <p:extLst>
       <p:ext uri="{BB962C8B-B14F-4D97-AF65-F5344CB8AC3E}">
@@ -2173,7 +2169,7 @@
   <p:timing>
     <p:tnLst>
       <p:par>
-        <p:cTn xmlns:p14="http://schemas.microsoft.com/office/powerpoint/2010/main" id="1" dur="indefinite" restart="never" nodeType="tmRoot"/>
+        <p:cTn id="1" dur="indefinite" restart="never" nodeType="tmRoot"/>
       </p:par>
     </p:tnLst>
   </p:timing>
@@ -2441,7 +2437,12 @@
 </file>
 
 <file path=customXml/item1.xml><?xml version="1.0" encoding="utf-8"?>
-<LongProperties xmlns="http://schemas.microsoft.com/office/2006/metadata/longProperties"/>
+<?mso-contentType ?>
+<FormTemplates xmlns="http://schemas.microsoft.com/sharepoint/v3/contenttype/forms">
+  <Display>DocumentLibraryForm</Display>
+  <Edit>DocumentLibraryForm</Edit>
+  <New>DocumentLibraryForm</New>
+</FormTemplates>
 </file>
 
 <file path=customXml/item2.xml><?xml version="1.0" encoding="utf-8"?>
@@ -2463,12 +2464,7 @@
 </file>
 
 <file path=customXml/item3.xml><?xml version="1.0" encoding="utf-8"?>
-<?mso-contentType ?>
-<FormTemplates xmlns="http://schemas.microsoft.com/sharepoint/v3/contenttype/forms">
-  <Display>DocumentLibraryForm</Display>
-  <Edit>DocumentLibraryForm</Edit>
-  <New>DocumentLibraryForm</New>
-</FormTemplates>
+<LongProperties xmlns="http://schemas.microsoft.com/office/2006/metadata/longProperties"/>
 </file>
 
 <file path=customXml/item4.xml><?xml version="1.0" encoding="utf-8"?>
@@ -2617,9 +2613,9 @@
 </file>
 
 <file path=customXml/itemProps1.xml><?xml version="1.0" encoding="utf-8"?>
-<ds:datastoreItem xmlns:ds="http://schemas.openxmlformats.org/officeDocument/2006/customXml" ds:itemID="{34ACECAE-8DDC-4218-ADDE-80828E100BF5}">
+<ds:datastoreItem xmlns:ds="http://schemas.openxmlformats.org/officeDocument/2006/customXml" ds:itemID="{47870AFC-B140-4E73-B0E2-054A74E7EB25}">
   <ds:schemaRefs>
-    <ds:schemaRef ds:uri="http://schemas.microsoft.com/office/2006/metadata/longProperties"/>
+    <ds:schemaRef ds:uri="http://schemas.microsoft.com/sharepoint/v3/contenttype/forms"/>
   </ds:schemaRefs>
 </ds:datastoreItem>
 </file>
@@ -2642,9 +2638,9 @@
 </file>
 
 <file path=customXml/itemProps3.xml><?xml version="1.0" encoding="utf-8"?>
-<ds:datastoreItem xmlns:ds="http://schemas.openxmlformats.org/officeDocument/2006/customXml" ds:itemID="{47870AFC-B140-4E73-B0E2-054A74E7EB25}">
+<ds:datastoreItem xmlns:ds="http://schemas.openxmlformats.org/officeDocument/2006/customXml" ds:itemID="{34ACECAE-8DDC-4218-ADDE-80828E100BF5}">
   <ds:schemaRefs>
-    <ds:schemaRef ds:uri="http://schemas.microsoft.com/sharepoint/v3/contenttype/forms"/>
+    <ds:schemaRef ds:uri="http://schemas.microsoft.com/office/2006/metadata/longProperties"/>
   </ds:schemaRefs>
 </ds:datastoreItem>
 </file>

</xml_diff>

<commit_message>
Minor fixes, added PDF
</commit_message>
<xml_diff>
--- a/poster/Poster A1, Bitmessage for Android, Christian Basler.pptx
+++ b/poster/Poster A1, Bitmessage for Android, Christian Basler.pptx
@@ -188,14 +188,14 @@
             <a:noFill/>
           </a:ln>
           <a:extLst>
-            <a:ext uri="{909E8E84-426E-40DD-AFC4-6F175D3DCCD1}">
+            <a:ext uri="{909E8E84-426E-40dd-AFC4-6F175D3DCCD1}">
               <a14:hiddenFill xmlns:a14="http://schemas.microsoft.com/office/drawing/2010/main">
                 <a:solidFill>
                   <a:srgbClr val="FFFFFF"/>
                 </a:solidFill>
               </a14:hiddenFill>
             </a:ext>
-            <a:ext uri="{91240B29-F687-4F45-9708-019B960494DF}">
+            <a:ext uri="{91240B29-F687-4f45-9708-019B960494DF}">
               <a14:hiddenLine xmlns:a14="http://schemas.microsoft.com/office/drawing/2010/main" w="9525">
                 <a:solidFill>
                   <a:srgbClr val="000000"/>
@@ -273,14 +273,14 @@
             <a:noFill/>
           </a:ln>
           <a:extLst>
-            <a:ext uri="{909E8E84-426E-40DD-AFC4-6F175D3DCCD1}">
+            <a:ext uri="{909E8E84-426E-40dd-AFC4-6F175D3DCCD1}">
               <a14:hiddenFill xmlns:a14="http://schemas.microsoft.com/office/drawing/2010/main">
                 <a:solidFill>
                   <a:srgbClr val="FFFFFF"/>
                 </a:solidFill>
               </a14:hiddenFill>
             </a:ext>
-            <a:ext uri="{91240B29-F687-4F45-9708-019B960494DF}">
+            <a:ext uri="{91240B29-F687-4f45-9708-019B960494DF}">
               <a14:hiddenLine xmlns:a14="http://schemas.microsoft.com/office/drawing/2010/main" w="9525">
                 <a:solidFill>
                   <a:srgbClr val="000000"/>
@@ -501,7 +501,7 @@
   <p:timing>
     <p:tnLst>
       <p:par>
-        <p:cTn id="1" dur="indefinite" restart="never" nodeType="tmRoot"/>
+        <p:cTn xmlns:p14="http://schemas.microsoft.com/office/powerpoint/2010/main" id="1" dur="indefinite" restart="never" nodeType="tmRoot"/>
       </p:par>
     </p:tnLst>
   </p:timing>
@@ -1728,8 +1728,8 @@
         </p:nvSpPr>
         <p:spPr>
           <a:xfrm>
-            <a:off x="10822475" y="896767"/>
-            <a:ext cx="8845847" cy="15050274"/>
+            <a:off x="10704883" y="896767"/>
+            <a:ext cx="8845847" cy="16527607"/>
           </a:xfrm>
           <a:prstGeom prst="rect">
             <a:avLst/>
@@ -2014,7 +2014,19 @@
               <a:rPr lang="en-US" altLang="de-DE" sz="3200" dirty="0">
                 <a:latin typeface="Lucida Sans" pitchFamily="34" charset="0"/>
               </a:rPr>
-              <a:t>do all this you probably want as many CPU cores as possible, no shortage of electricity and a flat rate on internet access – not quite the prefect basis for a mobile app.</a:t>
+              <a:t>do all this you probably want as many CPU cores as possible, no shortage of electricity and a flat rate on internet access – not quite the </a:t>
+            </a:r>
+            <a:r>
+              <a:rPr lang="en-US" altLang="de-DE" sz="3200" dirty="0" smtClean="0">
+                <a:latin typeface="Lucida Sans" pitchFamily="34" charset="0"/>
+              </a:rPr>
+              <a:t>perfect </a:t>
+            </a:r>
+            <a:r>
+              <a:rPr lang="en-US" altLang="de-DE" sz="3200" dirty="0">
+                <a:latin typeface="Lucida Sans" pitchFamily="34" charset="0"/>
+              </a:rPr>
+              <a:t>basis for a mobile app.</a:t>
             </a:r>
           </a:p>
           <a:p>
@@ -2065,7 +2077,7 @@
           </a:prstGeom>
           <a:noFill/>
           <a:extLst>
-            <a:ext uri="{909E8E84-426E-40DD-AFC4-6F175D3DCCD1}">
+            <a:ext uri="{909E8E84-426E-40dd-AFC4-6F175D3DCCD1}">
               <a14:hiddenFill xmlns:a14="http://schemas.microsoft.com/office/drawing/2010/main">
                 <a:solidFill>
                   <a:srgbClr val="FFFFFF"/>
@@ -2130,8 +2142,8 @@
         </p:nvSpPr>
         <p:spPr>
           <a:xfrm>
-            <a:off x="20508883" y="14044808"/>
-            <a:ext cx="8845847" cy="2554545"/>
+            <a:off x="20508885" y="13038552"/>
+            <a:ext cx="8845846" cy="4524315"/>
           </a:xfrm>
           <a:prstGeom prst="rect">
             <a:avLst/>
@@ -2152,16 +2164,22 @@
               <a:defRPr/>
             </a:pPr>
             <a:r>
+              <a:rPr lang="en-GB" altLang="de-DE" sz="3200" dirty="0" err="1" smtClean="0">
+                <a:latin typeface="Lucida Sans" pitchFamily="34" charset="0"/>
+              </a:rPr>
+              <a:t>Abit</a:t>
+            </a:r>
+            <a:r>
               <a:rPr lang="en-GB" altLang="de-DE" sz="3200" dirty="0" smtClean="0">
                 <a:latin typeface="Lucida Sans" pitchFamily="34" charset="0"/>
               </a:rPr>
-              <a:t>The </a:t>
+              <a:t> looks </a:t>
             </a:r>
             <a:r>
               <a:rPr lang="en-GB" altLang="de-DE" sz="3200" dirty="0">
                 <a:latin typeface="Lucida Sans" pitchFamily="34" charset="0"/>
               </a:rPr>
-              <a:t>app looks just like any e-mail </a:t>
+              <a:t>just like any e-mail </a:t>
             </a:r>
             <a:r>
               <a:rPr lang="en-GB" altLang="de-DE" sz="3200" dirty="0" smtClean="0">
@@ -2185,13 +2203,58 @@
               <a:rPr lang="en-GB" altLang="de-DE" sz="3200" dirty="0">
                 <a:latin typeface="Lucida Sans" pitchFamily="34" charset="0"/>
               </a:rPr>
-              <a:t>starts the resource hungry connection to the </a:t>
+              <a:t>starts the </a:t>
             </a:r>
             <a:r>
               <a:rPr lang="en-GB" altLang="de-DE" sz="3200" dirty="0" smtClean="0">
                 <a:latin typeface="Lucida Sans" pitchFamily="34" charset="0"/>
               </a:rPr>
-              <a:t>network.</a:t>
+              <a:t>connection </a:t>
+            </a:r>
+            <a:r>
+              <a:rPr lang="en-GB" altLang="de-DE" sz="3200" dirty="0">
+                <a:latin typeface="Lucida Sans" pitchFamily="34" charset="0"/>
+              </a:rPr>
+              <a:t>to the </a:t>
+            </a:r>
+            <a:r>
+              <a:rPr lang="en-GB" altLang="de-DE" sz="3200" dirty="0" smtClean="0">
+                <a:latin typeface="Lucida Sans" pitchFamily="34" charset="0"/>
+              </a:rPr>
+              <a:t>network</a:t>
+            </a:r>
+            <a:r>
+              <a:rPr lang="en-GB" altLang="de-DE" sz="3200" dirty="0" smtClean="0">
+                <a:latin typeface="Lucida Sans" pitchFamily="34" charset="0"/>
+              </a:rPr>
+              <a:t>.</a:t>
+            </a:r>
+          </a:p>
+          <a:p>
+            <a:pPr algn="just">
+              <a:buClr>
+                <a:srgbClr val="FAA500"/>
+              </a:buClr>
+              <a:buSzPct val="80000"/>
+              <a:defRPr/>
+            </a:pPr>
+            <a:endParaRPr lang="en-GB" altLang="de-DE" sz="3200" dirty="0" smtClean="0">
+              <a:latin typeface="Lucida Sans" pitchFamily="34" charset="0"/>
+            </a:endParaRPr>
+          </a:p>
+          <a:p>
+            <a:pPr algn="just">
+              <a:buClr>
+                <a:srgbClr val="FAA500"/>
+              </a:buClr>
+              <a:buSzPct val="80000"/>
+              <a:defRPr/>
+            </a:pPr>
+            <a:r>
+              <a:rPr lang="en-GB" altLang="de-DE" sz="3200" dirty="0" smtClean="0">
+                <a:latin typeface="Lucida Sans" pitchFamily="34" charset="0"/>
+              </a:rPr>
+              <a:t>If a so called ‘trusted node’ is defined in the settings, it will periodically check for new messages even without the full node running.</a:t>
             </a:r>
             <a:endParaRPr lang="en-GB" altLang="de-DE" sz="3200" dirty="0">
               <a:latin typeface="Lucida Sans" pitchFamily="34" charset="0"/>
@@ -2268,19 +2331,13 @@
               <a:rPr lang="en-US" altLang="de-DE" sz="3200" i="1" dirty="0" smtClean="0">
                 <a:latin typeface="Lucida Sans" pitchFamily="34" charset="0"/>
               </a:rPr>
-              <a:t>to </a:t>
-            </a:r>
-            <a:r>
-              <a:rPr lang="en-US" altLang="de-DE" sz="3200" i="1" dirty="0">
-                <a:latin typeface="Lucida Sans" pitchFamily="34" charset="0"/>
-              </a:rPr>
-              <a:t>get </a:t>
+              <a:t>for more </a:t>
             </a:r>
             <a:r>
               <a:rPr lang="en-US" altLang="de-DE" sz="3200" i="1" dirty="0" smtClean="0">
                 <a:latin typeface="Lucida Sans" pitchFamily="34" charset="0"/>
               </a:rPr>
-              <a:t>more information </a:t>
+              <a:t>information </a:t>
             </a:r>
             <a:r>
               <a:rPr lang="en-US" altLang="de-DE" sz="3200" i="1" dirty="0">
@@ -2323,8 +2380,8 @@
         </p:blipFill>
         <p:spPr bwMode="auto">
           <a:xfrm>
-            <a:off x="21639490" y="2116308"/>
-            <a:ext cx="6584634" cy="11706017"/>
+            <a:off x="20602956" y="2116309"/>
+            <a:ext cx="5949347" cy="10576618"/>
           </a:xfrm>
           <a:prstGeom prst="rect">
             <a:avLst/>
@@ -2332,7 +2389,7 @@
           <a:noFill/>
           <a:effectLst/>
           <a:extLst>
-            <a:ext uri="{909E8E84-426E-40DD-AFC4-6F175D3DCCD1}">
+            <a:ext uri="{909E8E84-426E-40dd-AFC4-6F175D3DCCD1}">
               <a14:hiddenFill xmlns:a14="http://schemas.microsoft.com/office/drawing/2010/main">
                 <a:solidFill>
                   <a:srgbClr val="FFFFFF"/>
@@ -2355,7 +2412,7 @@
   <p:timing>
     <p:tnLst>
       <p:par>
-        <p:cTn id="1" dur="indefinite" restart="never" nodeType="tmRoot"/>
+        <p:cTn xmlns:p14="http://schemas.microsoft.com/office/powerpoint/2010/main" id="1" dur="indefinite" restart="never" nodeType="tmRoot"/>
       </p:par>
     </p:tnLst>
   </p:timing>
@@ -2623,37 +2680,10 @@
 </file>
 
 <file path=customXml/item1.xml><?xml version="1.0" encoding="utf-8"?>
-<?mso-contentType ?>
-<FormTemplates xmlns="http://schemas.microsoft.com/sharepoint/v3/contenttype/forms">
-  <Display>DocumentLibraryForm</Display>
-  <Edit>DocumentLibraryForm</Edit>
-  <New>DocumentLibraryForm</New>
-</FormTemplates>
+<LongProperties xmlns="http://schemas.microsoft.com/office/2006/metadata/longProperties"/>
 </file>
 
 <file path=customXml/item2.xml><?xml version="1.0" encoding="utf-8"?>
-<p:properties xmlns:p="http://schemas.microsoft.com/office/2006/metadata/properties" xmlns:xsi="http://www.w3.org/2001/XMLSchema-instance" xmlns:pc="http://schemas.microsoft.com/office/infopath/2007/PartnerControls">
-  <documentManagement>
-    <BfhIntranetDepartmentText xmlns="63c724b1-652e-424f-8d99-4ee509067280">
-      <Terms xmlns="http://schemas.microsoft.com/office/infopath/2007/PartnerControls">
-        <TermInfo xmlns="http://schemas.microsoft.com/office/infopath/2007/PartnerControls">
-          <TermName xmlns="http://schemas.microsoft.com/office/infopath/2007/PartnerControls">Vorlage</TermName>
-          <TermId xmlns="http://schemas.microsoft.com/office/infopath/2007/PartnerControls">de1a6d3c-ac6a-4b34-8edd-308eb81066db</TermId>
-        </TermInfo>
-      </Terms>
-    </BfhIntranetDepartmentText>
-    <TaxCatchAll xmlns="2551ef7e-3b29-44d1-a8ad-ef34c26bfc60">
-      <Value>241</Value>
-    </TaxCatchAll>
-  </documentManagement>
-</p:properties>
-</file>
-
-<file path=customXml/item3.xml><?xml version="1.0" encoding="utf-8"?>
-<LongProperties xmlns="http://schemas.microsoft.com/office/2006/metadata/longProperties"/>
-</file>
-
-<file path=customXml/item4.xml><?xml version="1.0" encoding="utf-8"?>
 <ct:contentTypeSchema xmlns:ct="http://schemas.microsoft.com/office/2006/metadata/contentType" xmlns:ma="http://schemas.microsoft.com/office/2006/metadata/properties/metaAttributes" ct:_="" ma:_="" ma:contentTypeName="BFH Document" ma:contentTypeID="0x0101009127C3B567804923A8661E062BBD8EF500562C9D82744B284A86093F1D9B579BDC" ma:contentTypeVersion="2" ma:contentTypeDescription="Ein neues Dokument erstellen." ma:contentTypeScope="" ma:versionID="9c45b5bf27c78835ceac1d8ed0ad849b">
   <xsd:schema xmlns:xsd="http://www.w3.org/2001/XMLSchema" xmlns:xs="http://www.w3.org/2001/XMLSchema" xmlns:p="http://schemas.microsoft.com/office/2006/metadata/properties" xmlns:ns2="63c724b1-652e-424f-8d99-4ee509067280" xmlns:ns3="2551ef7e-3b29-44d1-a8ad-ef34c26bfc60" targetNamespace="http://schemas.microsoft.com/office/2006/metadata/properties" ma:root="true" ma:fieldsID="77ddedd9f4909d73cfb737d3d691d0f9" ns2:_="" ns3:_="">
     <xsd:import namespace="63c724b1-652e-424f-8d99-4ee509067280"/>
@@ -2798,32 +2828,34 @@
 </ct:contentTypeSchema>
 </file>
 
-<file path=customXml/itemProps1.xml><?xml version="1.0" encoding="utf-8"?>
-<ds:datastoreItem xmlns:ds="http://schemas.openxmlformats.org/officeDocument/2006/customXml" ds:itemID="{47870AFC-B140-4E73-B0E2-054A74E7EB25}">
-  <ds:schemaRefs>
-    <ds:schemaRef ds:uri="http://schemas.microsoft.com/sharepoint/v3/contenttype/forms"/>
-  </ds:schemaRefs>
-</ds:datastoreItem>
+<file path=customXml/item3.xml><?xml version="1.0" encoding="utf-8"?>
+<?mso-contentType ?>
+<FormTemplates xmlns="http://schemas.microsoft.com/sharepoint/v3/contenttype/forms">
+  <Display>DocumentLibraryForm</Display>
+  <Edit>DocumentLibraryForm</Edit>
+  <New>DocumentLibraryForm</New>
+</FormTemplates>
 </file>
 
-<file path=customXml/itemProps2.xml><?xml version="1.0" encoding="utf-8"?>
-<ds:datastoreItem xmlns:ds="http://schemas.openxmlformats.org/officeDocument/2006/customXml" ds:itemID="{12310AE4-98C2-4A3E-BE75-5A8AB8823A32}">
-  <ds:schemaRefs>
-    <ds:schemaRef ds:uri="http://schemas.microsoft.com/office/2006/metadata/properties"/>
-    <ds:schemaRef ds:uri="http://schemas.microsoft.com/office/infopath/2007/PartnerControls"/>
-    <ds:schemaRef ds:uri="http://schemas.microsoft.com/office/2006/documentManagement/types"/>
-    <ds:schemaRef ds:uri="http://purl.org/dc/elements/1.1/"/>
-    <ds:schemaRef ds:uri="63c724b1-652e-424f-8d99-4ee509067280"/>
-    <ds:schemaRef ds:uri="http://purl.org/dc/terms/"/>
-    <ds:schemaRef ds:uri="http://www.w3.org/XML/1998/namespace"/>
-    <ds:schemaRef ds:uri="2551ef7e-3b29-44d1-a8ad-ef34c26bfc60"/>
-    <ds:schemaRef ds:uri="http://schemas.openxmlformats.org/package/2006/metadata/core-properties"/>
-    <ds:schemaRef ds:uri="http://purl.org/dc/dcmitype/"/>
-  </ds:schemaRefs>
-</ds:datastoreItem>
+<file path=customXml/item4.xml><?xml version="1.0" encoding="utf-8"?>
+<p:properties xmlns:p="http://schemas.microsoft.com/office/2006/metadata/properties" xmlns:xsi="http://www.w3.org/2001/XMLSchema-instance" xmlns:pc="http://schemas.microsoft.com/office/infopath/2007/PartnerControls">
+  <documentManagement>
+    <BfhIntranetDepartmentText xmlns="63c724b1-652e-424f-8d99-4ee509067280">
+      <Terms xmlns="http://schemas.microsoft.com/office/infopath/2007/PartnerControls">
+        <TermInfo xmlns="http://schemas.microsoft.com/office/infopath/2007/PartnerControls">
+          <TermName xmlns="http://schemas.microsoft.com/office/infopath/2007/PartnerControls">Vorlage</TermName>
+          <TermId xmlns="http://schemas.microsoft.com/office/infopath/2007/PartnerControls">de1a6d3c-ac6a-4b34-8edd-308eb81066db</TermId>
+        </TermInfo>
+      </Terms>
+    </BfhIntranetDepartmentText>
+    <TaxCatchAll xmlns="2551ef7e-3b29-44d1-a8ad-ef34c26bfc60">
+      <Value>241</Value>
+    </TaxCatchAll>
+  </documentManagement>
+</p:properties>
 </file>
 
-<file path=customXml/itemProps3.xml><?xml version="1.0" encoding="utf-8"?>
+<file path=customXml/itemProps1.xml><?xml version="1.0" encoding="utf-8"?>
 <ds:datastoreItem xmlns:ds="http://schemas.openxmlformats.org/officeDocument/2006/customXml" ds:itemID="{34ACECAE-8DDC-4218-ADDE-80828E100BF5}">
   <ds:schemaRefs>
     <ds:schemaRef ds:uri="http://schemas.microsoft.com/office/2006/metadata/longProperties"/>
@@ -2831,7 +2863,7 @@
 </ds:datastoreItem>
 </file>
 
-<file path=customXml/itemProps4.xml><?xml version="1.0" encoding="utf-8"?>
+<file path=customXml/itemProps2.xml><?xml version="1.0" encoding="utf-8"?>
 <ds:datastoreItem xmlns:ds="http://schemas.openxmlformats.org/officeDocument/2006/customXml" ds:itemID="{064F56C1-3E03-4158-81FF-45AFD11405FB}">
   <ds:schemaRefs>
     <ds:schemaRef ds:uri="http://schemas.microsoft.com/office/2006/metadata/contentType"/>
@@ -2848,4 +2880,29 @@
     <ds:schemaRef ds:uri="http://schemas.microsoft.com/internal/obd"/>
   </ds:schemaRefs>
 </ds:datastoreItem>
+</file>
+
+<file path=customXml/itemProps3.xml><?xml version="1.0" encoding="utf-8"?>
+<ds:datastoreItem xmlns:ds="http://schemas.openxmlformats.org/officeDocument/2006/customXml" ds:itemID="{47870AFC-B140-4E73-B0E2-054A74E7EB25}">
+  <ds:schemaRefs>
+    <ds:schemaRef ds:uri="http://schemas.microsoft.com/sharepoint/v3/contenttype/forms"/>
+  </ds:schemaRefs>
+</ds:datastoreItem>
+</file>
+
+<file path=customXml/itemProps4.xml><?xml version="1.0" encoding="utf-8"?>
+<ds:datastoreItem xmlns:ds="http://schemas.openxmlformats.org/officeDocument/2006/customXml" ds:itemID="{12310AE4-98C2-4A3E-BE75-5A8AB8823A32}">
+  <ds:schemaRefs>
+    <ds:schemaRef ds:uri="http://schemas.microsoft.com/office/2006/metadata/properties"/>
+    <ds:schemaRef ds:uri="http://schemas.microsoft.com/office/infopath/2007/PartnerControls"/>
+    <ds:schemaRef ds:uri="http://schemas.microsoft.com/office/2006/documentManagement/types"/>
+    <ds:schemaRef ds:uri="http://purl.org/dc/elements/1.1/"/>
+    <ds:schemaRef ds:uri="63c724b1-652e-424f-8d99-4ee509067280"/>
+    <ds:schemaRef ds:uri="http://purl.org/dc/terms/"/>
+    <ds:schemaRef ds:uri="http://www.w3.org/XML/1998/namespace"/>
+    <ds:schemaRef ds:uri="2551ef7e-3b29-44d1-a8ad-ef34c26bfc60"/>
+    <ds:schemaRef ds:uri="http://schemas.openxmlformats.org/package/2006/metadata/core-properties"/>
+    <ds:schemaRef ds:uri="http://purl.org/dc/dcmitype/"/>
+  </ds:schemaRefs>
+</ds:datastoreItem>
 </file>
</xml_diff>

<commit_message>
Changed Bitmessage address and rendered new PDF
</commit_message>
<xml_diff>
--- a/poster/Poster A1, Bitmessage for Android, Christian Basler.pptx
+++ b/poster/Poster A1, Bitmessage for Android, Christian Basler.pptx
@@ -188,14 +188,14 @@
             <a:noFill/>
           </a:ln>
           <a:extLst>
-            <a:ext uri="{909E8E84-426E-40DD-AFC4-6F175D3DCCD1}">
+            <a:ext uri="{909E8E84-426E-40dd-AFC4-6F175D3DCCD1}">
               <a14:hiddenFill xmlns:a14="http://schemas.microsoft.com/office/drawing/2010/main">
                 <a:solidFill>
                   <a:srgbClr val="FFFFFF"/>
                 </a:solidFill>
               </a14:hiddenFill>
             </a:ext>
-            <a:ext uri="{91240B29-F687-4F45-9708-019B960494DF}">
+            <a:ext uri="{91240B29-F687-4f45-9708-019B960494DF}">
               <a14:hiddenLine xmlns:a14="http://schemas.microsoft.com/office/drawing/2010/main" w="9525">
                 <a:solidFill>
                   <a:srgbClr val="000000"/>
@@ -273,14 +273,14 @@
             <a:noFill/>
           </a:ln>
           <a:extLst>
-            <a:ext uri="{909E8E84-426E-40DD-AFC4-6F175D3DCCD1}">
+            <a:ext uri="{909E8E84-426E-40dd-AFC4-6F175D3DCCD1}">
               <a14:hiddenFill xmlns:a14="http://schemas.microsoft.com/office/drawing/2010/main">
                 <a:solidFill>
                   <a:srgbClr val="FFFFFF"/>
                 </a:solidFill>
               </a14:hiddenFill>
             </a:ext>
-            <a:ext uri="{91240B29-F687-4F45-9708-019B960494DF}">
+            <a:ext uri="{91240B29-F687-4f45-9708-019B960494DF}">
               <a14:hiddenLine xmlns:a14="http://schemas.microsoft.com/office/drawing/2010/main" w="9525">
                 <a:solidFill>
                   <a:srgbClr val="000000"/>
@@ -501,7 +501,7 @@
   <p:timing>
     <p:tnLst>
       <p:par>
-        <p:cTn id="1" dur="indefinite" restart="never" nodeType="tmRoot"/>
+        <p:cTn xmlns:p14="http://schemas.microsoft.com/office/powerpoint/2010/main" id="1" dur="indefinite" restart="never" nodeType="tmRoot"/>
       </p:par>
     </p:tnLst>
   </p:timing>
@@ -952,7 +952,7 @@
           </a:prstGeom>
           <a:noFill/>
           <a:extLst>
-            <a:ext uri="{909E8E84-426E-40DD-AFC4-6F175D3DCCD1}">
+            <a:ext uri="{909E8E84-426E-40dd-AFC4-6F175D3DCCD1}">
               <a14:hiddenFill xmlns:a14="http://schemas.microsoft.com/office/drawing/2010/main">
                 <a:solidFill>
                   <a:srgbClr val="FFFFFF"/>
@@ -1568,7 +1568,7 @@
         <p:spPr>
           <a:xfrm>
             <a:off x="898776" y="896767"/>
-            <a:ext cx="8845847" cy="10002738"/>
+            <a:ext cx="8845847" cy="10495182"/>
           </a:xfrm>
           <a:prstGeom prst="rect">
             <a:avLst/>
@@ -1748,11 +1748,18 @@
               <a:defRPr/>
             </a:pPr>
             <a:r>
-              <a:rPr lang="en-GB" altLang="de-DE" sz="2800" dirty="0" smtClean="0">
+              <a:rPr lang="en-GB" altLang="de-DE" sz="2800" smtClean="0">
                 <a:latin typeface="Lucida Console"/>
                 <a:cs typeface="Lucida Console"/>
               </a:rPr>
-              <a:t>BM-2cWs84ik1Fj7jdJKrn3vDecxQbH9R4VS9r</a:t>
+              <a:t>BM</a:t>
+            </a:r>
+            <a:r>
+              <a:rPr lang="en-GB" altLang="de-DE" sz="2800">
+                <a:latin typeface="Lucida Console"/>
+                <a:cs typeface="Lucida Console"/>
+              </a:rPr>
+              <a:t>-2cUau5uxBYCK2Z2TVwUZnnNfYW5yyutekC</a:t>
             </a:r>
             <a:endParaRPr lang="en-GB" altLang="de-DE" sz="2800" dirty="0">
               <a:latin typeface="Lucida Console"/>
@@ -2118,7 +2125,7 @@
           </a:prstGeom>
           <a:noFill/>
           <a:extLst>
-            <a:ext uri="{909E8E84-426E-40DD-AFC4-6F175D3DCCD1}">
+            <a:ext uri="{909E8E84-426E-40dd-AFC4-6F175D3DCCD1}">
               <a14:hiddenFill xmlns:a14="http://schemas.microsoft.com/office/drawing/2010/main">
                 <a:solidFill>
                   <a:srgbClr val="FFFFFF"/>
@@ -2417,7 +2424,7 @@
           </a:prstGeom>
           <a:noFill/>
           <a:extLst>
-            <a:ext uri="{909E8E84-426E-40DD-AFC4-6F175D3DCCD1}">
+            <a:ext uri="{909E8E84-426E-40dd-AFC4-6F175D3DCCD1}">
               <a14:hiddenFill xmlns:a14="http://schemas.microsoft.com/office/drawing/2010/main">
                 <a:solidFill>
                   <a:srgbClr val="FFFFFF"/>
@@ -2440,7 +2447,7 @@
   <p:timing>
     <p:tnLst>
       <p:par>
-        <p:cTn id="1" dur="indefinite" restart="never" nodeType="tmRoot"/>
+        <p:cTn xmlns:p14="http://schemas.microsoft.com/office/powerpoint/2010/main" id="1" dur="indefinite" restart="never" nodeType="tmRoot"/>
       </p:par>
     </p:tnLst>
   </p:timing>
@@ -2708,6 +2715,28 @@
 </file>
 
 <file path=customXml/item1.xml><?xml version="1.0" encoding="utf-8"?>
+<LongProperties xmlns="http://schemas.microsoft.com/office/2006/metadata/longProperties"/>
+</file>
+
+<file path=customXml/item2.xml><?xml version="1.0" encoding="utf-8"?>
+<p:properties xmlns:p="http://schemas.microsoft.com/office/2006/metadata/properties" xmlns:xsi="http://www.w3.org/2001/XMLSchema-instance" xmlns:pc="http://schemas.microsoft.com/office/infopath/2007/PartnerControls">
+  <documentManagement>
+    <BfhIntranetDepartmentText xmlns="63c724b1-652e-424f-8d99-4ee509067280">
+      <Terms xmlns="http://schemas.microsoft.com/office/infopath/2007/PartnerControls">
+        <TermInfo xmlns="http://schemas.microsoft.com/office/infopath/2007/PartnerControls">
+          <TermName xmlns="http://schemas.microsoft.com/office/infopath/2007/PartnerControls">Vorlage</TermName>
+          <TermId xmlns="http://schemas.microsoft.com/office/infopath/2007/PartnerControls">de1a6d3c-ac6a-4b34-8edd-308eb81066db</TermId>
+        </TermInfo>
+      </Terms>
+    </BfhIntranetDepartmentText>
+    <TaxCatchAll xmlns="2551ef7e-3b29-44d1-a8ad-ef34c26bfc60">
+      <Value>241</Value>
+    </TaxCatchAll>
+  </documentManagement>
+</p:properties>
+</file>
+
+<file path=customXml/item3.xml><?xml version="1.0" encoding="utf-8"?>
 <?mso-contentType ?>
 <FormTemplates xmlns="http://schemas.microsoft.com/sharepoint/v3/contenttype/forms">
   <Display>DocumentLibraryForm</Display>
@@ -2716,7 +2745,7 @@
 </FormTemplates>
 </file>
 
-<file path=customXml/item2.xml><?xml version="1.0" encoding="utf-8"?>
+<file path=customXml/item4.xml><?xml version="1.0" encoding="utf-8"?>
 <ct:contentTypeSchema xmlns:ct="http://schemas.microsoft.com/office/2006/metadata/contentType" xmlns:ma="http://schemas.microsoft.com/office/2006/metadata/properties/metaAttributes" ct:_="" ma:_="" ma:contentTypeName="BFH Document" ma:contentTypeID="0x0101009127C3B567804923A8661E062BBD8EF500562C9D82744B284A86093F1D9B579BDC" ma:contentTypeVersion="2" ma:contentTypeDescription="Ein neues Dokument erstellen." ma:contentTypeScope="" ma:versionID="9c45b5bf27c78835ceac1d8ed0ad849b">
   <xsd:schema xmlns:xsd="http://www.w3.org/2001/XMLSchema" xmlns:xs="http://www.w3.org/2001/XMLSchema" xmlns:p="http://schemas.microsoft.com/office/2006/metadata/properties" xmlns:ns2="63c724b1-652e-424f-8d99-4ee509067280" xmlns:ns3="2551ef7e-3b29-44d1-a8ad-ef34c26bfc60" targetNamespace="http://schemas.microsoft.com/office/2006/metadata/properties" ma:root="true" ma:fieldsID="77ddedd9f4909d73cfb737d3d691d0f9" ns2:_="" ns3:_="">
     <xsd:import namespace="63c724b1-652e-424f-8d99-4ee509067280"/>
@@ -2861,29 +2890,32 @@
 </ct:contentTypeSchema>
 </file>
 
-<file path=customXml/item3.xml><?xml version="1.0" encoding="utf-8"?>
-<LongProperties xmlns="http://schemas.microsoft.com/office/2006/metadata/longProperties"/>
+<file path=customXml/itemProps1.xml><?xml version="1.0" encoding="utf-8"?>
+<ds:datastoreItem xmlns:ds="http://schemas.openxmlformats.org/officeDocument/2006/customXml" ds:itemID="{34ACECAE-8DDC-4218-ADDE-80828E100BF5}">
+  <ds:schemaRefs>
+    <ds:schemaRef ds:uri="http://schemas.microsoft.com/office/2006/metadata/longProperties"/>
+  </ds:schemaRefs>
+</ds:datastoreItem>
 </file>
 
-<file path=customXml/item4.xml><?xml version="1.0" encoding="utf-8"?>
-<p:properties xmlns:p="http://schemas.microsoft.com/office/2006/metadata/properties" xmlns:xsi="http://www.w3.org/2001/XMLSchema-instance" xmlns:pc="http://schemas.microsoft.com/office/infopath/2007/PartnerControls">
-  <documentManagement>
-    <BfhIntranetDepartmentText xmlns="63c724b1-652e-424f-8d99-4ee509067280">
-      <Terms xmlns="http://schemas.microsoft.com/office/infopath/2007/PartnerControls">
-        <TermInfo xmlns="http://schemas.microsoft.com/office/infopath/2007/PartnerControls">
-          <TermName xmlns="http://schemas.microsoft.com/office/infopath/2007/PartnerControls">Vorlage</TermName>
-          <TermId xmlns="http://schemas.microsoft.com/office/infopath/2007/PartnerControls">de1a6d3c-ac6a-4b34-8edd-308eb81066db</TermId>
-        </TermInfo>
-      </Terms>
-    </BfhIntranetDepartmentText>
-    <TaxCatchAll xmlns="2551ef7e-3b29-44d1-a8ad-ef34c26bfc60">
-      <Value>241</Value>
-    </TaxCatchAll>
-  </documentManagement>
-</p:properties>
+<file path=customXml/itemProps2.xml><?xml version="1.0" encoding="utf-8"?>
+<ds:datastoreItem xmlns:ds="http://schemas.openxmlformats.org/officeDocument/2006/customXml" ds:itemID="{12310AE4-98C2-4A3E-BE75-5A8AB8823A32}">
+  <ds:schemaRefs>
+    <ds:schemaRef ds:uri="http://schemas.microsoft.com/office/2006/metadata/properties"/>
+    <ds:schemaRef ds:uri="http://schemas.microsoft.com/office/infopath/2007/PartnerControls"/>
+    <ds:schemaRef ds:uri="http://schemas.microsoft.com/office/2006/documentManagement/types"/>
+    <ds:schemaRef ds:uri="http://purl.org/dc/elements/1.1/"/>
+    <ds:schemaRef ds:uri="63c724b1-652e-424f-8d99-4ee509067280"/>
+    <ds:schemaRef ds:uri="http://purl.org/dc/terms/"/>
+    <ds:schemaRef ds:uri="http://www.w3.org/XML/1998/namespace"/>
+    <ds:schemaRef ds:uri="2551ef7e-3b29-44d1-a8ad-ef34c26bfc60"/>
+    <ds:schemaRef ds:uri="http://schemas.openxmlformats.org/package/2006/metadata/core-properties"/>
+    <ds:schemaRef ds:uri="http://purl.org/dc/dcmitype/"/>
+  </ds:schemaRefs>
+</ds:datastoreItem>
 </file>
 
-<file path=customXml/itemProps1.xml><?xml version="1.0" encoding="utf-8"?>
+<file path=customXml/itemProps3.xml><?xml version="1.0" encoding="utf-8"?>
 <ds:datastoreItem xmlns:ds="http://schemas.openxmlformats.org/officeDocument/2006/customXml" ds:itemID="{47870AFC-B140-4E73-B0E2-054A74E7EB25}">
   <ds:schemaRefs>
     <ds:schemaRef ds:uri="http://schemas.microsoft.com/sharepoint/v3/contenttype/forms"/>
@@ -2891,7 +2923,7 @@
 </ds:datastoreItem>
 </file>
 
-<file path=customXml/itemProps2.xml><?xml version="1.0" encoding="utf-8"?>
+<file path=customXml/itemProps4.xml><?xml version="1.0" encoding="utf-8"?>
 <ds:datastoreItem xmlns:ds="http://schemas.openxmlformats.org/officeDocument/2006/customXml" ds:itemID="{064F56C1-3E03-4158-81FF-45AFD11405FB}">
   <ds:schemaRefs>
     <ds:schemaRef ds:uri="http://schemas.microsoft.com/office/2006/metadata/contentType"/>
@@ -2908,29 +2940,4 @@
     <ds:schemaRef ds:uri="http://schemas.microsoft.com/internal/obd"/>
   </ds:schemaRefs>
 </ds:datastoreItem>
-</file>
-
-<file path=customXml/itemProps3.xml><?xml version="1.0" encoding="utf-8"?>
-<ds:datastoreItem xmlns:ds="http://schemas.openxmlformats.org/officeDocument/2006/customXml" ds:itemID="{34ACECAE-8DDC-4218-ADDE-80828E100BF5}">
-  <ds:schemaRefs>
-    <ds:schemaRef ds:uri="http://schemas.microsoft.com/office/2006/metadata/longProperties"/>
-  </ds:schemaRefs>
-</ds:datastoreItem>
-</file>
-
-<file path=customXml/itemProps4.xml><?xml version="1.0" encoding="utf-8"?>
-<ds:datastoreItem xmlns:ds="http://schemas.openxmlformats.org/officeDocument/2006/customXml" ds:itemID="{12310AE4-98C2-4A3E-BE75-5A8AB8823A32}">
-  <ds:schemaRefs>
-    <ds:schemaRef ds:uri="http://schemas.microsoft.com/office/2006/metadata/properties"/>
-    <ds:schemaRef ds:uri="http://schemas.microsoft.com/office/infopath/2007/PartnerControls"/>
-    <ds:schemaRef ds:uri="http://schemas.microsoft.com/office/2006/documentManagement/types"/>
-    <ds:schemaRef ds:uri="http://purl.org/dc/elements/1.1/"/>
-    <ds:schemaRef ds:uri="63c724b1-652e-424f-8d99-4ee509067280"/>
-    <ds:schemaRef ds:uri="http://purl.org/dc/terms/"/>
-    <ds:schemaRef ds:uri="http://www.w3.org/XML/1998/namespace"/>
-    <ds:schemaRef ds:uri="2551ef7e-3b29-44d1-a8ad-ef34c26bfc60"/>
-    <ds:schemaRef ds:uri="http://schemas.openxmlformats.org/package/2006/metadata/core-properties"/>
-    <ds:schemaRef ds:uri="http://purl.org/dc/dcmitype/"/>
-  </ds:schemaRefs>
-</ds:datastoreItem>
 </file>
</xml_diff>

<commit_message>
I'm not quite sure if I forgot to save something or PowerPoint just had to save the fact that I did a spell check. Just in case.
</commit_message>
<xml_diff>
--- a/poster/Poster A1, Bitmessage for Android, Christian Basler.pptx
+++ b/poster/Poster A1, Bitmessage for Android, Christian Basler.pptx
@@ -987,11 +987,7 @@
             <a:pPr algn="ctr"/>
             <a:r>
               <a:rPr lang="en-US" sz="8000" dirty="0"/>
-              <a:t>An Android Client for </a:t>
-            </a:r>
-            <a:r>
-              <a:rPr lang="en-US" sz="8000" dirty="0" err="1"/>
-              <a:t>Bitmessage</a:t>
+              <a:t>An Android Client for Bitmessage</a:t>
             </a:r>
             <a:endParaRPr lang="en-GB" sz="8000" dirty="0">
               <a:latin typeface="+mj-lt"/>
@@ -1281,24 +1277,7 @@
                           <a:ea typeface="MS PGothic" pitchFamily="34" charset="-128"/>
                           <a:cs typeface="+mn-cs"/>
                         </a:rPr>
-                        <a:t>Dr. Kai </a:t>
-                      </a:r>
-                      <a:r>
-                        <a:rPr kumimoji="0" lang="de-CH" sz="3200" b="0" i="0" u="none" strike="noStrike" kern="1200" cap="none" spc="0" normalizeH="0" baseline="0" dirty="0" err="1" smtClean="0">
-                          <a:ln>
-                            <a:noFill/>
-                          </a:ln>
-                          <a:solidFill>
-                            <a:srgbClr val="697D91"/>
-                          </a:solidFill>
-                          <a:effectLst/>
-                          <a:uLnTx/>
-                          <a:uFillTx/>
-                          <a:latin typeface="Lucida Sans" pitchFamily="34" charset="0"/>
-                          <a:ea typeface="MS PGothic" pitchFamily="34" charset="-128"/>
-                          <a:cs typeface="+mn-cs"/>
-                        </a:rPr>
-                        <a:t>Brünnler</a:t>
+                        <a:t>Dr. Kai Brünnler</a:t>
                       </a:r>
                       <a:endParaRPr kumimoji="0" lang="fr-CH" sz="3200" b="0" i="0" u="none" strike="noStrike" kern="1200" cap="none" spc="0" normalizeH="0" baseline="0" dirty="0">
                         <a:ln>
@@ -1748,14 +1727,14 @@
               <a:defRPr/>
             </a:pPr>
             <a:r>
-              <a:rPr lang="en-GB" altLang="de-DE" sz="2800" smtClean="0">
+              <a:rPr lang="en-GB" altLang="de-DE" sz="2800" dirty="0" smtClean="0">
                 <a:latin typeface="Lucida Console"/>
                 <a:cs typeface="Lucida Console"/>
               </a:rPr>
               <a:t>BM</a:t>
             </a:r>
             <a:r>
-              <a:rPr lang="en-GB" altLang="de-DE" sz="2800">
+              <a:rPr lang="en-GB" altLang="de-DE" sz="2800" dirty="0">
                 <a:latin typeface="Lucida Console"/>
                 <a:cs typeface="Lucida Console"/>
               </a:rPr>
@@ -2212,16 +2191,10 @@
               <a:defRPr/>
             </a:pPr>
             <a:r>
-              <a:rPr lang="en-GB" altLang="de-DE" sz="3200" dirty="0" err="1" smtClean="0">
-                <a:latin typeface="Lucida Sans" pitchFamily="34" charset="0"/>
-              </a:rPr>
-              <a:t>Abit</a:t>
-            </a:r>
-            <a:r>
               <a:rPr lang="en-GB" altLang="de-DE" sz="3200" dirty="0" smtClean="0">
                 <a:latin typeface="Lucida Sans" pitchFamily="34" charset="0"/>
               </a:rPr>
-              <a:t> looks </a:t>
+              <a:t>Abit looks </a:t>
             </a:r>
             <a:r>
               <a:rPr lang="en-GB" altLang="de-DE" sz="3200" dirty="0">
@@ -2355,7 +2328,7 @@
               <a:t>dissem.ch/</a:t>
             </a:r>
             <a:r>
-              <a:rPr lang="en-US" altLang="de-DE" sz="3200" b="1" i="1" dirty="0" err="1">
+              <a:rPr lang="en-US" altLang="de-DE" sz="3200" b="1" i="1" dirty="0">
                 <a:solidFill>
                   <a:srgbClr val="0070C0"/>
                 </a:solidFill>

</xml_diff>